<commit_message>
simple linear regression CC-BY
</commit_message>
<xml_diff>
--- a/Presentations/ML Simple Linear Regression.pptx
+++ b/Presentations/ML Simple Linear Regression.pptx
@@ -3099,7 +3099,11 @@
             </a:br>
             <a:r>
               <a:rPr lang="en-US" dirty="0" smtClean="0"/>
-              <a:t>Part 1 – Linear Regression</a:t>
+              <a:t>Simple Linear </a:t>
+            </a:r>
+            <a:r>
+              <a:rPr lang="en-US" dirty="0" smtClean="0"/>
+              <a:t>Regression</a:t>
             </a:r>
             <a:r>
               <a:rPr lang="en-US" dirty="0"/>
@@ -3137,27 +3141,8 @@
                   </a:schemeClr>
                 </a:solidFill>
               </a:rPr>
-              <a:t>Andrew </a:t>
-            </a:r>
-            <a:r>
-              <a:rPr lang="en-US" sz="2400" dirty="0" err="1" smtClean="0">
-                <a:solidFill>
-                  <a:schemeClr val="accent1">
-                    <a:lumMod val="75000"/>
-                  </a:schemeClr>
-                </a:solidFill>
-              </a:rPr>
-              <a:t>Ferlitsch</a:t>
-            </a:r>
-            <a:endParaRPr lang="en-US" sz="2400" dirty="0" smtClean="0">
-              <a:solidFill>
-                <a:schemeClr val="accent1">
-                  <a:lumMod val="75000"/>
-                </a:schemeClr>
-              </a:solidFill>
-            </a:endParaRPr>
-          </a:p>
-          <a:p>
+              <a:t>Portland </a:t>
+            </a:r>
             <a:r>
               <a:rPr lang="en-US" sz="2400" dirty="0" smtClean="0">
                 <a:solidFill>
@@ -3166,7 +3151,7 @@
                   </a:schemeClr>
                 </a:solidFill>
               </a:rPr>
-              <a:t>Portland Data Science </a:t>
+              <a:t>Data Science </a:t>
             </a:r>
             <a:r>
               <a:rPr lang="en-US" sz="2400" dirty="0">
@@ -3195,6 +3180,45 @@
                   </a:schemeClr>
                 </a:solidFill>
               </a:rPr>
+              <a:t>Andrew </a:t>
+            </a:r>
+            <a:r>
+              <a:rPr lang="en-US" sz="2400" dirty="0" err="1" smtClean="0">
+                <a:solidFill>
+                  <a:schemeClr val="accent1">
+                    <a:lumMod val="75000"/>
+                  </a:schemeClr>
+                </a:solidFill>
+              </a:rPr>
+              <a:t>Ferlitsch</a:t>
+            </a:r>
+            <a:r>
+              <a:rPr lang="en-US" sz="2400" dirty="0">
+                <a:solidFill>
+                  <a:schemeClr val="accent1">
+                    <a:lumMod val="75000"/>
+                  </a:schemeClr>
+                </a:solidFill>
+              </a:rPr>
+              <a:t/>
+            </a:r>
+            <a:br>
+              <a:rPr lang="en-US" sz="2400" dirty="0">
+                <a:solidFill>
+                  <a:schemeClr val="accent1">
+                    <a:lumMod val="75000"/>
+                  </a:schemeClr>
+                </a:solidFill>
+              </a:rPr>
+            </a:br>
+            <a:r>
+              <a:rPr lang="en-US" sz="2400" dirty="0">
+                <a:solidFill>
+                  <a:schemeClr val="accent1">
+                    <a:lumMod val="75000"/>
+                  </a:schemeClr>
+                </a:solidFill>
+              </a:rPr>
               <a:t>Community Outreach </a:t>
             </a:r>
             <a:r>
@@ -3222,6 +3246,128 @@
           </a:p>
         </p:txBody>
       </p:sp>
+      <p:sp>
+        <p:nvSpPr>
+          <p:cNvPr id="4" name="Rectangle 3"/>
+          <p:cNvSpPr/>
+          <p:nvPr/>
+        </p:nvSpPr>
+        <p:spPr>
+          <a:xfrm>
+            <a:off x="7543800" y="5934075"/>
+            <a:ext cx="1447800" cy="762000"/>
+          </a:xfrm>
+          <a:prstGeom prst="rect">
+            <a:avLst/>
+          </a:prstGeom>
+        </p:spPr>
+        <p:style>
+          <a:lnRef idx="2">
+            <a:schemeClr val="accent1">
+              <a:shade val="50000"/>
+            </a:schemeClr>
+          </a:lnRef>
+          <a:fillRef idx="1">
+            <a:schemeClr val="accent1"/>
+          </a:fillRef>
+          <a:effectRef idx="0">
+            <a:schemeClr val="accent1"/>
+          </a:effectRef>
+          <a:fontRef idx="minor">
+            <a:schemeClr val="lt1"/>
+          </a:fontRef>
+        </p:style>
+        <p:txBody>
+          <a:bodyPr rtlCol="0" anchor="ctr"/>
+          <a:lstStyle/>
+          <a:p>
+            <a:pPr algn="ctr"/>
+            <a:endParaRPr lang="en-US"/>
+          </a:p>
+        </p:txBody>
+      </p:sp>
+      <p:pic>
+        <p:nvPicPr>
+          <p:cNvPr id="5" name="Picture 3" descr="C:\Users\Andrew\Desktop\cc_icon_white_x2.png"/>
+          <p:cNvPicPr>
+            <a:picLocks noChangeAspect="1" noChangeArrowheads="1"/>
+          </p:cNvPicPr>
+          <p:nvPr/>
+        </p:nvPicPr>
+        <p:blipFill>
+          <a:blip r:embed="rId2">
+            <a:extLst>
+              <a:ext uri="{28A0092B-C50C-407E-A947-70E740481C1C}">
+                <a14:useLocalDpi xmlns:a14="http://schemas.microsoft.com/office/drawing/2010/main" val="0"/>
+              </a:ext>
+            </a:extLst>
+          </a:blip>
+          <a:srcRect/>
+          <a:stretch>
+            <a:fillRect/>
+          </a:stretch>
+        </p:blipFill>
+        <p:spPr bwMode="auto">
+          <a:xfrm>
+            <a:off x="7607300" y="6010275"/>
+            <a:ext cx="609600" cy="609600"/>
+          </a:xfrm>
+          <a:prstGeom prst="rect">
+            <a:avLst/>
+          </a:prstGeom>
+          <a:noFill/>
+          <a:extLst>
+            <a:ext uri="{909E8E84-426E-40DD-AFC4-6F175D3DCCD1}">
+              <a14:hiddenFill xmlns:a14="http://schemas.microsoft.com/office/drawing/2010/main">
+                <a:solidFill>
+                  <a:srgbClr val="FFFFFF"/>
+                </a:solidFill>
+              </a14:hiddenFill>
+            </a:ext>
+          </a:extLst>
+        </p:spPr>
+      </p:pic>
+      <p:pic>
+        <p:nvPicPr>
+          <p:cNvPr id="6" name="Picture 4" descr="C:\Users\Andrew\Desktop\attribution_icon_white_x2.png"/>
+          <p:cNvPicPr>
+            <a:picLocks noChangeAspect="1" noChangeArrowheads="1"/>
+          </p:cNvPicPr>
+          <p:nvPr/>
+        </p:nvPicPr>
+        <p:blipFill>
+          <a:blip r:embed="rId3">
+            <a:extLst>
+              <a:ext uri="{28A0092B-C50C-407E-A947-70E740481C1C}">
+                <a14:useLocalDpi xmlns:a14="http://schemas.microsoft.com/office/drawing/2010/main" val="0"/>
+              </a:ext>
+            </a:extLst>
+          </a:blip>
+          <a:srcRect/>
+          <a:stretch>
+            <a:fillRect/>
+          </a:stretch>
+        </p:blipFill>
+        <p:spPr bwMode="auto">
+          <a:xfrm>
+            <a:off x="8296275" y="6022975"/>
+            <a:ext cx="596900" cy="596900"/>
+          </a:xfrm>
+          <a:prstGeom prst="rect">
+            <a:avLst/>
+          </a:prstGeom>
+          <a:noFill/>
+          <a:extLst>
+            <a:ext uri="{909E8E84-426E-40DD-AFC4-6F175D3DCCD1}">
+              <a14:hiddenFill xmlns:a14="http://schemas.microsoft.com/office/drawing/2010/main">
+                <a:solidFill>
+                  <a:srgbClr val="FFFFFF"/>
+                </a:solidFill>
+              </a14:hiddenFill>
+            </a:ext>
+          </a:extLst>
+        </p:spPr>
+      </p:pic>
     </p:spTree>
     <p:extLst>
       <p:ext uri="{BB962C8B-B14F-4D97-AF65-F5344CB8AC3E}">
@@ -4124,47 +4270,7 @@
                   </a:schemeClr>
                 </a:solidFill>
               </a:rPr>
-              <a:t>independent </a:t>
-            </a:r>
-            <a:r>
-              <a:rPr lang="en-US" sz="2800" b="1" dirty="0" smtClean="0">
-                <a:solidFill>
-                  <a:schemeClr val="accent5">
-                    <a:lumMod val="75000"/>
-                  </a:schemeClr>
-                </a:solidFill>
-              </a:rPr>
-              <a:t>variables </a:t>
-            </a:r>
-            <a:r>
-              <a:rPr lang="en-US" sz="2800" b="1" dirty="0" smtClean="0">
-                <a:solidFill>
-                  <a:schemeClr val="accent5">
-                    <a:lumMod val="75000"/>
-                  </a:schemeClr>
-                </a:solidFill>
-              </a:rPr>
-              <a:t>and a dependent </a:t>
-            </a:r>
-            <a:r>
-              <a:rPr lang="en-US" sz="2800" b="1" dirty="0" smtClean="0">
-                <a:solidFill>
-                  <a:schemeClr val="accent5">
-                    <a:lumMod val="75000"/>
-                  </a:schemeClr>
-                </a:solidFill>
-              </a:rPr>
-              <a:t>variable.</a:t>
-            </a:r>
-            <a:r>
-              <a:rPr lang="en-US" sz="2800" b="1" dirty="0" smtClean="0">
-                <a:solidFill>
-                  <a:schemeClr val="accent5">
-                    <a:lumMod val="75000"/>
-                  </a:schemeClr>
-                </a:solidFill>
-              </a:rPr>
-              <a:t/>
+              <a:t>independent variables and a dependent variable.</a:t>
             </a:r>
             <a:br>
               <a:rPr lang="en-US" sz="2800" b="1" dirty="0" smtClean="0">
@@ -4885,13 +4991,6 @@
               </a:rPr>
               <a:t>Elementary Geometry: Definition of a Line</a:t>
             </a:r>
-            <a:endParaRPr lang="en-US" sz="2800" b="1" dirty="0" smtClean="0">
-              <a:solidFill>
-                <a:schemeClr val="accent5">
-                  <a:lumMod val="75000"/>
-                </a:schemeClr>
-              </a:solidFill>
-            </a:endParaRPr>
           </a:p>
           <a:p>
             <a:pPr marL="457200" indent="-457200">
@@ -4915,17 +5014,7 @@
                   </a:schemeClr>
                 </a:solidFill>
               </a:rPr>
-              <a:t>	</a:t>
-            </a:r>
-            <a:r>
-              <a:rPr lang="en-US" sz="2800" b="1" dirty="0" smtClean="0">
-                <a:solidFill>
-                  <a:schemeClr val="accent5">
-                    <a:lumMod val="75000"/>
-                  </a:schemeClr>
-                </a:solidFill>
-              </a:rPr>
-              <a:t>			</a:t>
+              <a:t>				</a:t>
             </a:r>
             <a:r>
               <a:rPr lang="en-US" sz="2800" b="1" dirty="0" smtClean="0">
@@ -4933,15 +5022,7 @@
                   <a:srgbClr val="00B050"/>
                 </a:solidFill>
               </a:rPr>
-              <a:t>y </a:t>
-            </a:r>
-            <a:r>
-              <a:rPr lang="en-US" sz="2800" b="1" dirty="0" smtClean="0">
-                <a:solidFill>
-                  <a:srgbClr val="00B050"/>
-                </a:solidFill>
-              </a:rPr>
-              <a:t>= mx + b</a:t>
+              <a:t>y = mx + b</a:t>
             </a:r>
           </a:p>
           <a:p>
@@ -4996,17 +5077,7 @@
                   </a:schemeClr>
                 </a:solidFill>
               </a:rPr>
-              <a:t>	</a:t>
-            </a:r>
-            <a:r>
-              <a:rPr lang="en-US" sz="2800" b="1" dirty="0" smtClean="0">
-                <a:solidFill>
-                  <a:schemeClr val="accent5">
-                    <a:lumMod val="75000"/>
-                  </a:schemeClr>
-                </a:solidFill>
-              </a:rPr>
-              <a:t>			</a:t>
+              <a:t>				</a:t>
             </a:r>
             <a:r>
               <a:rPr lang="en-US" sz="2800" b="1" dirty="0" smtClean="0">
@@ -5014,15 +5085,7 @@
                   <a:srgbClr val="00B050"/>
                 </a:solidFill>
               </a:rPr>
-              <a:t>y </a:t>
-            </a:r>
-            <a:r>
-              <a:rPr lang="en-US" sz="2800" b="1" dirty="0" smtClean="0">
-                <a:solidFill>
-                  <a:srgbClr val="00B050"/>
-                </a:solidFill>
-              </a:rPr>
-              <a:t>= a + </a:t>
+              <a:t>y = a + </a:t>
             </a:r>
             <a:r>
               <a:rPr lang="en-US" sz="2800" b="1" dirty="0" err="1" smtClean="0">
@@ -5089,17 +5152,7 @@
                   </a:schemeClr>
                 </a:solidFill>
               </a:rPr>
-              <a:t>	</a:t>
-            </a:r>
-            <a:r>
-              <a:rPr lang="en-US" sz="2800" b="1" dirty="0" smtClean="0">
-                <a:solidFill>
-                  <a:schemeClr val="accent5">
-                    <a:lumMod val="75000"/>
-                  </a:schemeClr>
-                </a:solidFill>
-              </a:rPr>
-              <a:t>			</a:t>
+              <a:t>				</a:t>
             </a:r>
             <a:r>
               <a:rPr lang="en-US" sz="2800" b="1" dirty="0" smtClean="0">
@@ -5107,15 +5160,7 @@
                   <a:srgbClr val="00B050"/>
                 </a:solidFill>
               </a:rPr>
-              <a:t>y </a:t>
-            </a:r>
-            <a:r>
-              <a:rPr lang="en-US" sz="2800" b="1" dirty="0" smtClean="0">
-                <a:solidFill>
-                  <a:srgbClr val="00B050"/>
-                </a:solidFill>
-              </a:rPr>
-              <a:t>= b</a:t>
+              <a:t>y = b</a:t>
             </a:r>
             <a:r>
               <a:rPr lang="en-US" sz="2800" b="1" baseline="-25000" dirty="0" smtClean="0">
@@ -8723,8 +8768,8 @@
           </a:fontRef>
         </p:style>
       </p:cxnSp>
-      <mc:AlternateContent xmlns:mc="http://schemas.openxmlformats.org/markup-compatibility/2006">
-        <mc:Choice xmlns:a14="http://schemas.microsoft.com/office/drawing/2010/main" Requires="a14">
+      <mc:AlternateContent xmlns:mc="http://schemas.openxmlformats.org/markup-compatibility/2006" xmlns:a14="http://schemas.microsoft.com/office/drawing/2010/main">
+        <mc:Choice Requires="a14">
           <p:sp>
             <p:nvSpPr>
               <p:cNvPr id="7" name="TextBox 6"/>
@@ -8788,7 +8833,7 @@
             </p:txBody>
           </p:sp>
         </mc:Choice>
-        <mc:Fallback>
+        <mc:Fallback xmlns="">
           <p:sp>
             <p:nvSpPr>
               <p:cNvPr id="7" name="TextBox 6"/>
@@ -8827,8 +8872,8 @@
           </p:sp>
         </mc:Fallback>
       </mc:AlternateContent>
-      <mc:AlternateContent xmlns:mc="http://schemas.openxmlformats.org/markup-compatibility/2006">
-        <mc:Choice xmlns:a14="http://schemas.microsoft.com/office/drawing/2010/main" Requires="a14">
+      <mc:AlternateContent xmlns:mc="http://schemas.openxmlformats.org/markup-compatibility/2006" xmlns:a14="http://schemas.microsoft.com/office/drawing/2010/main">
+        <mc:Choice Requires="a14">
           <p:sp>
             <p:nvSpPr>
               <p:cNvPr id="29" name="TextBox 28"/>
@@ -8898,7 +8943,7 @@
             </p:txBody>
           </p:sp>
         </mc:Choice>
-        <mc:Fallback>
+        <mc:Fallback xmlns="">
           <p:sp>
             <p:nvSpPr>
               <p:cNvPr id="29" name="TextBox 28"/>
@@ -8937,8 +8982,8 @@
           </p:sp>
         </mc:Fallback>
       </mc:AlternateContent>
-      <mc:AlternateContent xmlns:mc="http://schemas.openxmlformats.org/markup-compatibility/2006">
-        <mc:Choice xmlns:a14="http://schemas.microsoft.com/office/drawing/2010/main" Requires="a14">
+      <mc:AlternateContent xmlns:mc="http://schemas.openxmlformats.org/markup-compatibility/2006" xmlns:a14="http://schemas.microsoft.com/office/drawing/2010/main">
+        <mc:Choice Requires="a14">
           <p:sp>
             <p:nvSpPr>
               <p:cNvPr id="37" name="TextBox 36"/>
@@ -9002,7 +9047,7 @@
             </p:txBody>
           </p:sp>
         </mc:Choice>
-        <mc:Fallback>
+        <mc:Fallback xmlns="">
           <p:sp>
             <p:nvSpPr>
               <p:cNvPr id="37" name="TextBox 36"/>
@@ -9041,8 +9086,8 @@
           </p:sp>
         </mc:Fallback>
       </mc:AlternateContent>
-      <mc:AlternateContent xmlns:mc="http://schemas.openxmlformats.org/markup-compatibility/2006">
-        <mc:Choice xmlns:a14="http://schemas.microsoft.com/office/drawing/2010/main" Requires="a14">
+      <mc:AlternateContent xmlns:mc="http://schemas.openxmlformats.org/markup-compatibility/2006" xmlns:a14="http://schemas.microsoft.com/office/drawing/2010/main">
+        <mc:Choice Requires="a14">
           <p:sp>
             <p:nvSpPr>
               <p:cNvPr id="39" name="TextBox 38"/>
@@ -9106,7 +9151,7 @@
             </p:txBody>
           </p:sp>
         </mc:Choice>
-        <mc:Fallback>
+        <mc:Fallback xmlns="">
           <p:sp>
             <p:nvSpPr>
               <p:cNvPr id="39" name="TextBox 38"/>
@@ -9145,8 +9190,8 @@
           </p:sp>
         </mc:Fallback>
       </mc:AlternateContent>
-      <mc:AlternateContent xmlns:mc="http://schemas.openxmlformats.org/markup-compatibility/2006">
-        <mc:Choice xmlns:a14="http://schemas.microsoft.com/office/drawing/2010/main" Requires="a14">
+      <mc:AlternateContent xmlns:mc="http://schemas.openxmlformats.org/markup-compatibility/2006" xmlns:a14="http://schemas.microsoft.com/office/drawing/2010/main">
+        <mc:Choice Requires="a14">
           <p:sp>
             <p:nvSpPr>
               <p:cNvPr id="40" name="TextBox 39"/>
@@ -9220,7 +9265,7 @@
             </p:txBody>
           </p:sp>
         </mc:Choice>
-        <mc:Fallback>
+        <mc:Fallback xmlns="">
           <p:sp>
             <p:nvSpPr>
               <p:cNvPr id="40" name="TextBox 39"/>
@@ -9259,8 +9304,8 @@
           </p:sp>
         </mc:Fallback>
       </mc:AlternateContent>
-      <mc:AlternateContent xmlns:mc="http://schemas.openxmlformats.org/markup-compatibility/2006">
-        <mc:Choice xmlns:a14="http://schemas.microsoft.com/office/drawing/2010/main" Requires="a14">
+      <mc:AlternateContent xmlns:mc="http://schemas.openxmlformats.org/markup-compatibility/2006" xmlns:a14="http://schemas.microsoft.com/office/drawing/2010/main">
+        <mc:Choice Requires="a14">
           <p:sp>
             <p:nvSpPr>
               <p:cNvPr id="42" name="TextBox 41"/>
@@ -9324,7 +9369,7 @@
             </p:txBody>
           </p:sp>
         </mc:Choice>
-        <mc:Fallback>
+        <mc:Fallback xmlns="">
           <p:sp>
             <p:nvSpPr>
               <p:cNvPr id="42" name="TextBox 41"/>
@@ -9432,8 +9477,8 @@
           </a:p>
         </p:txBody>
       </p:sp>
-      <mc:AlternateContent xmlns:mc="http://schemas.openxmlformats.org/markup-compatibility/2006">
-        <mc:Choice xmlns:a14="http://schemas.microsoft.com/office/drawing/2010/main" Requires="a14">
+      <mc:AlternateContent xmlns:mc="http://schemas.openxmlformats.org/markup-compatibility/2006" xmlns:a14="http://schemas.microsoft.com/office/drawing/2010/main">
+        <mc:Choice Requires="a14">
           <p:sp>
             <p:nvSpPr>
               <p:cNvPr id="43" name="TextBox 42"/>
@@ -9501,7 +9546,7 @@
             </p:txBody>
           </p:sp>
         </mc:Choice>
-        <mc:Fallback>
+        <mc:Fallback xmlns="">
           <p:sp>
             <p:nvSpPr>
               <p:cNvPr id="43" name="TextBox 42"/>
@@ -9570,8 +9615,8 @@
           </a:p>
         </p:txBody>
       </p:sp>
-      <mc:AlternateContent xmlns:mc="http://schemas.openxmlformats.org/markup-compatibility/2006">
-        <mc:Choice xmlns:a14="http://schemas.microsoft.com/office/drawing/2010/main" Requires="a14">
+      <mc:AlternateContent xmlns:mc="http://schemas.openxmlformats.org/markup-compatibility/2006" xmlns:a14="http://schemas.microsoft.com/office/drawing/2010/main">
+        <mc:Choice Requires="a14">
           <p:sp>
             <p:nvSpPr>
               <p:cNvPr id="45" name="TextBox 44"/>
@@ -9635,7 +9680,7 @@
             </p:txBody>
           </p:sp>
         </mc:Choice>
-        <mc:Fallback>
+        <mc:Fallback xmlns="">
           <p:sp>
             <p:nvSpPr>
               <p:cNvPr id="45" name="TextBox 44"/>
@@ -9674,8 +9719,8 @@
           </p:sp>
         </mc:Fallback>
       </mc:AlternateContent>
-      <mc:AlternateContent xmlns:mc="http://schemas.openxmlformats.org/markup-compatibility/2006">
-        <mc:Choice xmlns:a14="http://schemas.microsoft.com/office/drawing/2010/main" Requires="a14">
+      <mc:AlternateContent xmlns:mc="http://schemas.openxmlformats.org/markup-compatibility/2006" xmlns:a14="http://schemas.microsoft.com/office/drawing/2010/main">
+        <mc:Choice Requires="a14">
           <p:sp>
             <p:nvSpPr>
               <p:cNvPr id="46" name="TextBox 45"/>
@@ -9739,7 +9784,7 @@
             </p:txBody>
           </p:sp>
         </mc:Choice>
-        <mc:Fallback>
+        <mc:Fallback xmlns="">
           <p:sp>
             <p:nvSpPr>
               <p:cNvPr id="46" name="TextBox 45"/>
@@ -9847,8 +9892,8 @@
           </a:fontRef>
         </p:style>
       </p:cxnSp>
-      <mc:AlternateContent xmlns:mc="http://schemas.openxmlformats.org/markup-compatibility/2006">
-        <mc:Choice xmlns:a14="http://schemas.microsoft.com/office/drawing/2010/main" Requires="a14">
+      <mc:AlternateContent xmlns:mc="http://schemas.openxmlformats.org/markup-compatibility/2006" xmlns:a14="http://schemas.microsoft.com/office/drawing/2010/main">
+        <mc:Choice Requires="a14">
           <p:sp>
             <p:nvSpPr>
               <p:cNvPr id="49" name="TextBox 48"/>
@@ -9922,7 +9967,7 @@
             </p:txBody>
           </p:sp>
         </mc:Choice>
-        <mc:Fallback>
+        <mc:Fallback xmlns="">
           <p:sp>
             <p:nvSpPr>
               <p:cNvPr id="49" name="TextBox 48"/>
@@ -9961,8 +10006,8 @@
           </p:sp>
         </mc:Fallback>
       </mc:AlternateContent>
-      <mc:AlternateContent xmlns:mc="http://schemas.openxmlformats.org/markup-compatibility/2006">
-        <mc:Choice xmlns:a14="http://schemas.microsoft.com/office/drawing/2010/main" Requires="a14">
+      <mc:AlternateContent xmlns:mc="http://schemas.openxmlformats.org/markup-compatibility/2006" xmlns:a14="http://schemas.microsoft.com/office/drawing/2010/main">
+        <mc:Choice Requires="a14">
           <p:sp>
             <p:nvSpPr>
               <p:cNvPr id="50" name="TextBox 49"/>
@@ -10026,7 +10071,7 @@
             </p:txBody>
           </p:sp>
         </mc:Choice>
-        <mc:Fallback>
+        <mc:Fallback xmlns="">
           <p:sp>
             <p:nvSpPr>
               <p:cNvPr id="50" name="TextBox 49"/>
@@ -10100,8 +10145,8 @@
           </a:p>
         </p:txBody>
       </p:sp>
-      <mc:AlternateContent xmlns:mc="http://schemas.openxmlformats.org/markup-compatibility/2006">
-        <mc:Choice xmlns:a14="http://schemas.microsoft.com/office/drawing/2010/main" Requires="a14">
+      <mc:AlternateContent xmlns:mc="http://schemas.openxmlformats.org/markup-compatibility/2006" xmlns:a14="http://schemas.microsoft.com/office/drawing/2010/main">
+        <mc:Choice Requires="a14">
           <p:sp>
             <p:nvSpPr>
               <p:cNvPr id="51" name="TextBox 50"/>
@@ -10219,7 +10264,7 @@
             </p:txBody>
           </p:sp>
         </mc:Choice>
-        <mc:Fallback>
+        <mc:Fallback xmlns="">
           <p:sp>
             <p:nvSpPr>
               <p:cNvPr id="51" name="TextBox 50"/>
@@ -10258,8 +10303,8 @@
           </p:sp>
         </mc:Fallback>
       </mc:AlternateContent>
-      <mc:AlternateContent xmlns:mc="http://schemas.openxmlformats.org/markup-compatibility/2006">
-        <mc:Choice xmlns:a14="http://schemas.microsoft.com/office/drawing/2010/main" Requires="a14">
+      <mc:AlternateContent xmlns:mc="http://schemas.openxmlformats.org/markup-compatibility/2006" xmlns:a14="http://schemas.microsoft.com/office/drawing/2010/main">
+        <mc:Choice Requires="a14">
           <p:sp>
             <p:nvSpPr>
               <p:cNvPr id="52" name="TextBox 51"/>
@@ -10383,7 +10428,7 @@
             </p:txBody>
           </p:sp>
         </mc:Choice>
-        <mc:Fallback>
+        <mc:Fallback xmlns="">
           <p:sp>
             <p:nvSpPr>
               <p:cNvPr id="52" name="TextBox 51"/>
@@ -10422,8 +10467,8 @@
           </p:sp>
         </mc:Fallback>
       </mc:AlternateContent>
-      <mc:AlternateContent xmlns:mc="http://schemas.openxmlformats.org/markup-compatibility/2006">
-        <mc:Choice xmlns:a14="http://schemas.microsoft.com/office/drawing/2010/main" Requires="a14">
+      <mc:AlternateContent xmlns:mc="http://schemas.openxmlformats.org/markup-compatibility/2006" xmlns:a14="http://schemas.microsoft.com/office/drawing/2010/main">
+        <mc:Choice Requires="a14">
           <p:sp>
             <p:nvSpPr>
               <p:cNvPr id="53" name="TextBox 52"/>
@@ -10571,7 +10616,7 @@
             </p:txBody>
           </p:sp>
         </mc:Choice>
-        <mc:Fallback>
+        <mc:Fallback xmlns="">
           <p:sp>
             <p:nvSpPr>
               <p:cNvPr id="53" name="TextBox 52"/>
@@ -10610,8 +10655,8 @@
           </p:sp>
         </mc:Fallback>
       </mc:AlternateContent>
-      <mc:AlternateContent xmlns:mc="http://schemas.openxmlformats.org/markup-compatibility/2006">
-        <mc:Choice xmlns:a14="http://schemas.microsoft.com/office/drawing/2010/main" Requires="a14">
+      <mc:AlternateContent xmlns:mc="http://schemas.openxmlformats.org/markup-compatibility/2006" xmlns:a14="http://schemas.microsoft.com/office/drawing/2010/main">
+        <mc:Choice Requires="a14">
           <p:sp>
             <p:nvSpPr>
               <p:cNvPr id="54" name="TextBox 53"/>
@@ -10747,7 +10792,7 @@
             </p:txBody>
           </p:sp>
         </mc:Choice>
-        <mc:Fallback>
+        <mc:Fallback xmlns="">
           <p:sp>
             <p:nvSpPr>
               <p:cNvPr id="54" name="TextBox 53"/>
@@ -11660,8 +11705,8 @@
           </a:p>
         </p:txBody>
       </p:sp>
-      <mc:AlternateContent xmlns:mc="http://schemas.openxmlformats.org/markup-compatibility/2006">
-        <mc:Choice xmlns:a14="http://schemas.microsoft.com/office/drawing/2010/main" Requires="a14">
+      <mc:AlternateContent xmlns:mc="http://schemas.openxmlformats.org/markup-compatibility/2006" xmlns:a14="http://schemas.microsoft.com/office/drawing/2010/main">
+        <mc:Choice Requires="a14">
           <p:sp>
             <p:nvSpPr>
               <p:cNvPr id="12" name="TextBox 11"/>
@@ -11725,7 +11770,7 @@
             </p:txBody>
           </p:sp>
         </mc:Choice>
-        <mc:Fallback>
+        <mc:Fallback xmlns="">
           <p:sp>
             <p:nvSpPr>
               <p:cNvPr id="12" name="TextBox 11"/>
@@ -11764,8 +11809,8 @@
           </p:sp>
         </mc:Fallback>
       </mc:AlternateContent>
-      <mc:AlternateContent xmlns:mc="http://schemas.openxmlformats.org/markup-compatibility/2006">
-        <mc:Choice xmlns:a14="http://schemas.microsoft.com/office/drawing/2010/main" Requires="a14">
+      <mc:AlternateContent xmlns:mc="http://schemas.openxmlformats.org/markup-compatibility/2006" xmlns:a14="http://schemas.microsoft.com/office/drawing/2010/main">
+        <mc:Choice Requires="a14">
           <p:sp>
             <p:nvSpPr>
               <p:cNvPr id="13" name="TextBox 12"/>
@@ -11835,7 +11880,7 @@
             </p:txBody>
           </p:sp>
         </mc:Choice>
-        <mc:Fallback>
+        <mc:Fallback xmlns="">
           <p:sp>
             <p:nvSpPr>
               <p:cNvPr id="13" name="TextBox 12"/>
@@ -11874,8 +11919,8 @@
           </p:sp>
         </mc:Fallback>
       </mc:AlternateContent>
-      <mc:AlternateContent xmlns:mc="http://schemas.openxmlformats.org/markup-compatibility/2006">
-        <mc:Choice xmlns:a14="http://schemas.microsoft.com/office/drawing/2010/main" Requires="a14">
+      <mc:AlternateContent xmlns:mc="http://schemas.openxmlformats.org/markup-compatibility/2006" xmlns:a14="http://schemas.microsoft.com/office/drawing/2010/main">
+        <mc:Choice Requires="a14">
           <p:sp>
             <p:nvSpPr>
               <p:cNvPr id="14" name="TextBox 13"/>
@@ -11939,7 +11984,7 @@
             </p:txBody>
           </p:sp>
         </mc:Choice>
-        <mc:Fallback>
+        <mc:Fallback xmlns="">
           <p:sp>
             <p:nvSpPr>
               <p:cNvPr id="14" name="TextBox 13"/>
@@ -11978,8 +12023,8 @@
           </p:sp>
         </mc:Fallback>
       </mc:AlternateContent>
-      <mc:AlternateContent xmlns:mc="http://schemas.openxmlformats.org/markup-compatibility/2006">
-        <mc:Choice xmlns:a14="http://schemas.microsoft.com/office/drawing/2010/main" Requires="a14">
+      <mc:AlternateContent xmlns:mc="http://schemas.openxmlformats.org/markup-compatibility/2006" xmlns:a14="http://schemas.microsoft.com/office/drawing/2010/main">
+        <mc:Choice Requires="a14">
           <p:sp>
             <p:nvSpPr>
               <p:cNvPr id="15" name="TextBox 14"/>
@@ -12089,7 +12134,7 @@
             </p:txBody>
           </p:sp>
         </mc:Choice>
-        <mc:Fallback>
+        <mc:Fallback xmlns="">
           <p:sp>
             <p:nvSpPr>
               <p:cNvPr id="15" name="TextBox 14"/>
@@ -12128,8 +12173,8 @@
           </p:sp>
         </mc:Fallback>
       </mc:AlternateContent>
-      <mc:AlternateContent xmlns:mc="http://schemas.openxmlformats.org/markup-compatibility/2006">
-        <mc:Choice xmlns:a14="http://schemas.microsoft.com/office/drawing/2010/main" Requires="a14">
+      <mc:AlternateContent xmlns:mc="http://schemas.openxmlformats.org/markup-compatibility/2006" xmlns:a14="http://schemas.microsoft.com/office/drawing/2010/main">
+        <mc:Choice Requires="a14">
           <p:sp>
             <p:nvSpPr>
               <p:cNvPr id="16" name="TextBox 15"/>
@@ -12203,7 +12248,7 @@
             </p:txBody>
           </p:sp>
         </mc:Choice>
-        <mc:Fallback>
+        <mc:Fallback xmlns="">
           <p:sp>
             <p:nvSpPr>
               <p:cNvPr id="16" name="TextBox 15"/>
@@ -12242,8 +12287,8 @@
           </p:sp>
         </mc:Fallback>
       </mc:AlternateContent>
-      <mc:AlternateContent xmlns:mc="http://schemas.openxmlformats.org/markup-compatibility/2006">
-        <mc:Choice xmlns:a14="http://schemas.microsoft.com/office/drawing/2010/main" Requires="a14">
+      <mc:AlternateContent xmlns:mc="http://schemas.openxmlformats.org/markup-compatibility/2006" xmlns:a14="http://schemas.microsoft.com/office/drawing/2010/main">
+        <mc:Choice Requires="a14">
           <p:sp>
             <p:nvSpPr>
               <p:cNvPr id="17" name="TextBox 16"/>
@@ -12296,13 +12341,13 @@
                           <a:rPr lang="en-US" b="0" i="1" smtClean="0">
                             <a:latin typeface="Cambria Math"/>
                           </a:rPr>
-                          <m:t> )2   </m:t>
+                          <m:t> )2       </m:t>
                         </m:r>
                         <m:r>
                           <a:rPr lang="en-US" b="0" i="1" baseline="30000" smtClean="0">
                             <a:latin typeface="Cambria Math"/>
                           </a:rPr>
-                          <m:t>                                     =</m:t>
+                          <m:t>                                 =</m:t>
                         </m:r>
                         <m:d>
                           <m:dPr>
@@ -12365,7 +12410,7 @@
             </p:txBody>
           </p:sp>
         </mc:Choice>
-        <mc:Fallback>
+        <mc:Fallback xmlns="">
           <p:sp>
             <p:nvSpPr>
               <p:cNvPr id="17" name="TextBox 16"/>
@@ -12404,8 +12449,8 @@
           </p:sp>
         </mc:Fallback>
       </mc:AlternateContent>
-      <mc:AlternateContent xmlns:mc="http://schemas.openxmlformats.org/markup-compatibility/2006">
-        <mc:Choice xmlns:a14="http://schemas.microsoft.com/office/drawing/2010/main" Requires="a14">
+      <mc:AlternateContent xmlns:mc="http://schemas.openxmlformats.org/markup-compatibility/2006" xmlns:a14="http://schemas.microsoft.com/office/drawing/2010/main">
+        <mc:Choice Requires="a14">
           <p:sp>
             <p:nvSpPr>
               <p:cNvPr id="18" name="TextBox 17"/>
@@ -12473,7 +12518,7 @@
             </p:txBody>
           </p:sp>
         </mc:Choice>
-        <mc:Fallback>
+        <mc:Fallback xmlns="">
           <p:sp>
             <p:nvSpPr>
               <p:cNvPr id="18" name="TextBox 17"/>
@@ -12512,8 +12557,8 @@
           </p:sp>
         </mc:Fallback>
       </mc:AlternateContent>
-      <mc:AlternateContent xmlns:mc="http://schemas.openxmlformats.org/markup-compatibility/2006">
-        <mc:Choice xmlns:a14="http://schemas.microsoft.com/office/drawing/2010/main" Requires="a14">
+      <mc:AlternateContent xmlns:mc="http://schemas.openxmlformats.org/markup-compatibility/2006" xmlns:a14="http://schemas.microsoft.com/office/drawing/2010/main">
+        <mc:Choice Requires="a14">
           <p:sp>
             <p:nvSpPr>
               <p:cNvPr id="19" name="TextBox 18"/>
@@ -12577,7 +12622,7 @@
             </p:txBody>
           </p:sp>
         </mc:Choice>
-        <mc:Fallback>
+        <mc:Fallback xmlns="">
           <p:sp>
             <p:nvSpPr>
               <p:cNvPr id="19" name="TextBox 18"/>
@@ -12616,8 +12661,8 @@
           </p:sp>
         </mc:Fallback>
       </mc:AlternateContent>
-      <mc:AlternateContent xmlns:mc="http://schemas.openxmlformats.org/markup-compatibility/2006">
-        <mc:Choice xmlns:a14="http://schemas.microsoft.com/office/drawing/2010/main" Requires="a14">
+      <mc:AlternateContent xmlns:mc="http://schemas.openxmlformats.org/markup-compatibility/2006" xmlns:a14="http://schemas.microsoft.com/office/drawing/2010/main">
+        <mc:Choice Requires="a14">
           <p:sp>
             <p:nvSpPr>
               <p:cNvPr id="20" name="TextBox 19"/>
@@ -12727,7 +12772,7 @@
             </p:txBody>
           </p:sp>
         </mc:Choice>
-        <mc:Fallback>
+        <mc:Fallback xmlns="">
           <p:sp>
             <p:nvSpPr>
               <p:cNvPr id="20" name="TextBox 19"/>

</xml_diff>

<commit_message>
updates for linear regression
</commit_message>
<xml_diff>
--- a/Presentations/ML Simple Linear Regression.pptx
+++ b/Presentations/ML Simple Linear Regression.pptx
@@ -296,7 +296,7 @@
             <a:fld id="{1D8BD707-D9CF-40AE-B4C6-C98DA3205C09}" type="datetimeFigureOut">
               <a:rPr lang="en-US" smtClean="0"/>
               <a:pPr/>
-              <a:t>11/11/2017</a:t>
+              <a:t>11/26/2017</a:t>
             </a:fld>
             <a:endParaRPr lang="en-US"/>
           </a:p>
@@ -463,7 +463,7 @@
             <a:fld id="{1D8BD707-D9CF-40AE-B4C6-C98DA3205C09}" type="datetimeFigureOut">
               <a:rPr lang="en-US" smtClean="0"/>
               <a:pPr/>
-              <a:t>11/11/2017</a:t>
+              <a:t>11/26/2017</a:t>
             </a:fld>
             <a:endParaRPr lang="en-US"/>
           </a:p>
@@ -640,7 +640,7 @@
             <a:fld id="{1D8BD707-D9CF-40AE-B4C6-C98DA3205C09}" type="datetimeFigureOut">
               <a:rPr lang="en-US" smtClean="0"/>
               <a:pPr/>
-              <a:t>11/11/2017</a:t>
+              <a:t>11/26/2017</a:t>
             </a:fld>
             <a:endParaRPr lang="en-US"/>
           </a:p>
@@ -807,7 +807,7 @@
             <a:fld id="{1D8BD707-D9CF-40AE-B4C6-C98DA3205C09}" type="datetimeFigureOut">
               <a:rPr lang="en-US" smtClean="0"/>
               <a:pPr/>
-              <a:t>11/11/2017</a:t>
+              <a:t>11/26/2017</a:t>
             </a:fld>
             <a:endParaRPr lang="en-US"/>
           </a:p>
@@ -1050,7 +1050,7 @@
             <a:fld id="{1D8BD707-D9CF-40AE-B4C6-C98DA3205C09}" type="datetimeFigureOut">
               <a:rPr lang="en-US" smtClean="0"/>
               <a:pPr/>
-              <a:t>11/11/2017</a:t>
+              <a:t>11/26/2017</a:t>
             </a:fld>
             <a:endParaRPr lang="en-US"/>
           </a:p>
@@ -1335,7 +1335,7 @@
             <a:fld id="{1D8BD707-D9CF-40AE-B4C6-C98DA3205C09}" type="datetimeFigureOut">
               <a:rPr lang="en-US" smtClean="0"/>
               <a:pPr/>
-              <a:t>11/11/2017</a:t>
+              <a:t>11/26/2017</a:t>
             </a:fld>
             <a:endParaRPr lang="en-US"/>
           </a:p>
@@ -1754,7 +1754,7 @@
             <a:fld id="{1D8BD707-D9CF-40AE-B4C6-C98DA3205C09}" type="datetimeFigureOut">
               <a:rPr lang="en-US" smtClean="0"/>
               <a:pPr/>
-              <a:t>11/11/2017</a:t>
+              <a:t>11/26/2017</a:t>
             </a:fld>
             <a:endParaRPr lang="en-US"/>
           </a:p>
@@ -1869,7 +1869,7 @@
             <a:fld id="{1D8BD707-D9CF-40AE-B4C6-C98DA3205C09}" type="datetimeFigureOut">
               <a:rPr lang="en-US" smtClean="0"/>
               <a:pPr/>
-              <a:t>11/11/2017</a:t>
+              <a:t>11/26/2017</a:t>
             </a:fld>
             <a:endParaRPr lang="en-US"/>
           </a:p>
@@ -1961,7 +1961,7 @@
             <a:fld id="{1D8BD707-D9CF-40AE-B4C6-C98DA3205C09}" type="datetimeFigureOut">
               <a:rPr lang="en-US" smtClean="0"/>
               <a:pPr/>
-              <a:t>11/11/2017</a:t>
+              <a:t>11/26/2017</a:t>
             </a:fld>
             <a:endParaRPr lang="en-US"/>
           </a:p>
@@ -2235,7 +2235,7 @@
             <a:fld id="{1D8BD707-D9CF-40AE-B4C6-C98DA3205C09}" type="datetimeFigureOut">
               <a:rPr lang="en-US" smtClean="0"/>
               <a:pPr/>
-              <a:t>11/11/2017</a:t>
+              <a:t>11/26/2017</a:t>
             </a:fld>
             <a:endParaRPr lang="en-US"/>
           </a:p>
@@ -2485,7 +2485,7 @@
             <a:fld id="{1D8BD707-D9CF-40AE-B4C6-C98DA3205C09}" type="datetimeFigureOut">
               <a:rPr lang="en-US" smtClean="0"/>
               <a:pPr/>
-              <a:t>11/11/2017</a:t>
+              <a:t>11/26/2017</a:t>
             </a:fld>
             <a:endParaRPr lang="en-US"/>
           </a:p>
@@ -2695,7 +2695,7 @@
             <a:fld id="{1D8BD707-D9CF-40AE-B4C6-C98DA3205C09}" type="datetimeFigureOut">
               <a:rPr lang="en-US" smtClean="0"/>
               <a:pPr/>
-              <a:t>11/11/2017</a:t>
+              <a:t>11/26/2017</a:t>
             </a:fld>
             <a:endParaRPr lang="en-US"/>
           </a:p>
@@ -5739,8 +5739,8 @@
         </p:nvCxnSpPr>
         <p:spPr>
           <a:xfrm flipV="1">
-            <a:off x="2133600" y="3352800"/>
-            <a:ext cx="3962400" cy="990600"/>
+            <a:off x="1524000" y="3352800"/>
+            <a:ext cx="4572000" cy="1168628"/>
           </a:xfrm>
           <a:prstGeom prst="line">
             <a:avLst/>
@@ -6874,7 +6874,7 @@
         </p:nvSpPr>
         <p:spPr>
           <a:xfrm>
-            <a:off x="1740212" y="4645223"/>
+            <a:off x="1106652" y="4792188"/>
             <a:ext cx="279244" cy="307777"/>
           </a:xfrm>
           <a:prstGeom prst="rect">
@@ -6914,7 +6914,7 @@
         </p:nvCxnSpPr>
         <p:spPr>
           <a:xfrm rot="5400000" flipH="1" flipV="1">
-            <a:off x="1882922" y="4394545"/>
+            <a:off x="1249362" y="4541510"/>
             <a:ext cx="247591" cy="253766"/>
           </a:xfrm>
           <a:prstGeom prst="curvedConnector2">
@@ -7481,7 +7481,7 @@
         <p:spPr>
           <a:xfrm>
             <a:off x="2419350" y="4260008"/>
-            <a:ext cx="1869486" cy="307777"/>
+            <a:ext cx="1629100" cy="307777"/>
           </a:xfrm>
           <a:prstGeom prst="rect">
             <a:avLst/>
@@ -7505,14 +7505,14 @@
               <a:t>Predicted Values (</a:t>
             </a:r>
             <a:r>
-              <a:rPr lang="en-US" sz="1400" dirty="0" err="1" smtClean="0">
+              <a:rPr lang="cy-GB" sz="1400" dirty="0" smtClean="0">
                 <a:solidFill>
                   <a:schemeClr val="accent6">
                     <a:lumMod val="75000"/>
                   </a:schemeClr>
                 </a:solidFill>
               </a:rPr>
-              <a:t>yhat</a:t>
+              <a:t>ŷ</a:t>
             </a:r>
             <a:r>
               <a:rPr lang="en-US" sz="1400" dirty="0" smtClean="0">
@@ -8039,7 +8039,7 @@
             <p:spPr>
               <a:xfrm>
                 <a:off x="3572523" y="5424550"/>
-                <a:ext cx="1986185" cy="879856"/>
+                <a:ext cx="1545295" cy="879856"/>
               </a:xfrm>
               <a:prstGeom prst="rect">
                 <a:avLst/>
@@ -8144,19 +8144,7 @@
                                 <a:rPr lang="en-US" b="0" i="1" smtClean="0">
                                   <a:latin typeface="Cambria Math"/>
                                 </a:rPr>
-                                <m:t>−</m:t>
-                              </m:r>
-                              <m:r>
-                                <a:rPr lang="en-US" b="0" i="1" smtClean="0">
-                                  <a:latin typeface="Cambria Math"/>
-                                </a:rPr>
-                                <m:t>𝑦h𝑎𝑡</m:t>
-                              </m:r>
-                              <m:r>
-                                <a:rPr lang="en-US" b="0" i="1" smtClean="0">
-                                  <a:latin typeface="Cambria Math"/>
-                                </a:rPr>
-                                <m:t>)</m:t>
+                                <m:t>−ŷ)</m:t>
                               </m:r>
                             </m:e>
                             <m:sup>
@@ -8190,7 +8178,7 @@
             <p:spPr>
               <a:xfrm>
                 <a:off x="3572523" y="5424550"/>
-                <a:ext cx="1986185" cy="879856"/>
+                <a:ext cx="1545295" cy="879856"/>
               </a:xfrm>
               <a:prstGeom prst="rect">
                 <a:avLst/>
@@ -8336,7 +8324,7 @@
         <p:spPr>
           <a:xfrm>
             <a:off x="1219061" y="2796321"/>
-            <a:ext cx="867482" cy="307777"/>
+            <a:ext cx="627095" cy="307777"/>
           </a:xfrm>
           <a:prstGeom prst="rect">
             <a:avLst/>
@@ -8360,14 +8348,14 @@
               <a:t>(y – </a:t>
             </a:r>
             <a:r>
-              <a:rPr lang="en-US" sz="1400" dirty="0" err="1" smtClean="0">
+              <a:rPr lang="cy-GB" sz="1400" dirty="0" smtClean="0">
                 <a:solidFill>
                   <a:schemeClr val="accent6">
                     <a:lumMod val="75000"/>
                   </a:schemeClr>
                 </a:solidFill>
               </a:rPr>
-              <a:t>yhat</a:t>
+              <a:t>ŷ</a:t>
             </a:r>
             <a:r>
               <a:rPr lang="en-US" sz="1400" dirty="0" smtClean="0">
@@ -9262,8 +9250,8 @@
           </p:sp>
         </mc:Fallback>
       </mc:AlternateContent>
-      <mc:AlternateContent xmlns:mc="http://schemas.openxmlformats.org/markup-compatibility/2006" xmlns:a14="http://schemas.microsoft.com/office/drawing/2010/main">
-        <mc:Choice Requires="a14">
+      <mc:AlternateContent xmlns:mc="http://schemas.openxmlformats.org/markup-compatibility/2006">
+        <mc:Choice xmlns:a14="http://schemas.microsoft.com/office/drawing/2010/main" Requires="a14">
           <p:sp>
             <p:nvSpPr>
               <p:cNvPr id="42" name="TextBox 41"/>
@@ -9327,7 +9315,7 @@
             </p:txBody>
           </p:sp>
         </mc:Choice>
-        <mc:Fallback xmlns="">
+        <mc:Fallback>
           <p:sp>
             <p:nvSpPr>
               <p:cNvPr id="42" name="TextBox 41"/>
@@ -9964,8 +9952,8 @@
           </p:sp>
         </mc:Fallback>
       </mc:AlternateContent>
-      <mc:AlternateContent xmlns:mc="http://schemas.openxmlformats.org/markup-compatibility/2006" xmlns:a14="http://schemas.microsoft.com/office/drawing/2010/main">
-        <mc:Choice Requires="a14">
+      <mc:AlternateContent xmlns:mc="http://schemas.openxmlformats.org/markup-compatibility/2006">
+        <mc:Choice xmlns:a14="http://schemas.microsoft.com/office/drawing/2010/main" Requires="a14">
           <p:sp>
             <p:nvSpPr>
               <p:cNvPr id="50" name="TextBox 49"/>
@@ -10029,7 +10017,7 @@
             </p:txBody>
           </p:sp>
         </mc:Choice>
-        <mc:Fallback xmlns="">
+        <mc:Fallback>
           <p:sp>
             <p:nvSpPr>
               <p:cNvPr id="50" name="TextBox 49"/>
@@ -10919,7 +10907,7 @@
           <p:nvPr>
             <p:extLst>
               <p:ext uri="{D42A27DB-BD31-4B8C-83A1-F6EECF244321}">
-                <p14:modId xmlns:p14="http://schemas.microsoft.com/office/powerpoint/2010/main" val="1648279180"/>
+                <p14:modId xmlns:p14="http://schemas.microsoft.com/office/powerpoint/2010/main" val="3954710501"/>
               </p:ext>
             </p:extLst>
           </p:nvPr>
@@ -11399,7 +11387,7 @@
                     <a:p>
                       <a:r>
                         <a:rPr lang="en-US" dirty="0" smtClean="0"/>
-                        <a:t>3125</a:t>
+                        <a:t>3150</a:t>
                       </a:r>
                       <a:endParaRPr lang="en-US" dirty="0"/>
                     </a:p>
@@ -11981,8 +11969,8 @@
           </p:sp>
         </mc:Fallback>
       </mc:AlternateContent>
-      <mc:AlternateContent xmlns:mc="http://schemas.openxmlformats.org/markup-compatibility/2006" xmlns:a14="http://schemas.microsoft.com/office/drawing/2010/main">
-        <mc:Choice Requires="a14">
+      <mc:AlternateContent xmlns:mc="http://schemas.openxmlformats.org/markup-compatibility/2006">
+        <mc:Choice xmlns:a14="http://schemas.microsoft.com/office/drawing/2010/main" Requires="a14">
           <p:sp>
             <p:nvSpPr>
               <p:cNvPr id="15" name="TextBox 14"/>
@@ -11992,7 +11980,7 @@
             <p:spPr>
               <a:xfrm>
                 <a:off x="2722667" y="5093787"/>
-                <a:ext cx="5651804" cy="369332"/>
+                <a:ext cx="5523563" cy="369332"/>
               </a:xfrm>
               <a:prstGeom prst="rect">
                 <a:avLst/>
@@ -12050,7 +12038,13 @@
                               <a:rPr lang="en-US" b="0" i="1" smtClean="0">
                                 <a:latin typeface="Cambria Math"/>
                               </a:rPr>
-                              <m:t>160 ∗3125</m:t>
+                              <m:t>160 ∗31</m:t>
+                            </m:r>
+                            <m:r>
+                              <a:rPr lang="en-US" b="0" i="1" smtClean="0">
+                                <a:latin typeface="Cambria Math"/>
+                              </a:rPr>
+                              <m:t>50</m:t>
                             </m:r>
                           </m:e>
                         </m:d>
@@ -12081,7 +12075,19 @@
                           <a:rPr lang="en-US" b="0" i="1" smtClean="0">
                             <a:latin typeface="Cambria Math"/>
                           </a:rPr>
-                          <m:t>=−39000</m:t>
+                          <m:t>=−3</m:t>
+                        </m:r>
+                        <m:r>
+                          <a:rPr lang="en-US" b="0" i="1" smtClean="0">
+                            <a:latin typeface="Cambria Math"/>
+                          </a:rPr>
+                          <m:t>5</m:t>
+                        </m:r>
+                        <m:r>
+                          <a:rPr lang="en-US" b="0" i="1" smtClean="0">
+                            <a:latin typeface="Cambria Math"/>
+                          </a:rPr>
+                          <m:t>000</m:t>
                         </m:r>
                       </m:e>
                     </m:nary>
@@ -12092,7 +12098,7 @@
             </p:txBody>
           </p:sp>
         </mc:Choice>
-        <mc:Fallback xmlns="">
+        <mc:Fallback>
           <p:sp>
             <p:nvSpPr>
               <p:cNvPr id="15" name="TextBox 14"/>
@@ -12104,7 +12110,7 @@
             <p:spPr>
               <a:xfrm>
                 <a:off x="2722667" y="5093787"/>
-                <a:ext cx="5651804" cy="369332"/>
+                <a:ext cx="5523563" cy="369332"/>
               </a:xfrm>
               <a:prstGeom prst="rect">
                 <a:avLst/>
@@ -12112,7 +12118,7 @@
               <a:blipFill rotWithShape="1">
                 <a:blip r:embed="rId5"/>
                 <a:stretch>
-                  <a:fillRect l="-3883" t="-121667" b="-188333"/>
+                  <a:fillRect l="-3974" t="-121667" b="-188333"/>
                 </a:stretch>
               </a:blipFill>
             </p:spPr>
@@ -12245,8 +12251,8 @@
           </p:sp>
         </mc:Fallback>
       </mc:AlternateContent>
-      <mc:AlternateContent xmlns:mc="http://schemas.openxmlformats.org/markup-compatibility/2006" xmlns:a14="http://schemas.microsoft.com/office/drawing/2010/main">
-        <mc:Choice Requires="a14">
+      <mc:AlternateContent xmlns:mc="http://schemas.openxmlformats.org/markup-compatibility/2006">
+        <mc:Choice xmlns:a14="http://schemas.microsoft.com/office/drawing/2010/main" Requires="a14">
           <p:sp>
             <p:nvSpPr>
               <p:cNvPr id="17" name="TextBox 16"/>
@@ -12256,7 +12262,7 @@
             <p:spPr>
               <a:xfrm>
                 <a:off x="1515776" y="5856902"/>
-                <a:ext cx="5250861" cy="369332"/>
+                <a:ext cx="5356659" cy="369332"/>
               </a:xfrm>
               <a:prstGeom prst="rect">
                 <a:avLst/>
@@ -12299,13 +12305,19 @@
                           <a:rPr lang="en-US" b="0" i="1" smtClean="0">
                             <a:latin typeface="Cambria Math"/>
                           </a:rPr>
-                          <m:t> )2           </m:t>
+                          <m:t> )2   </m:t>
+                        </m:r>
+                        <m:r>
+                          <a:rPr lang="en-US" b="0" i="1" smtClean="0">
+                            <a:latin typeface="Cambria Math"/>
+                          </a:rPr>
+                          <m:t>                  </m:t>
                         </m:r>
                         <m:r>
                           <a:rPr lang="en-US" b="0" i="1" baseline="30000" smtClean="0">
                             <a:latin typeface="Cambria Math"/>
                           </a:rPr>
-                          <m:t>                             =</m:t>
+                          <m:t>          =</m:t>
                         </m:r>
                         <m:d>
                           <m:dPr>
@@ -12320,7 +12332,19 @@
                               <a:rPr lang="en-US" b="0" i="1" smtClean="0">
                                 <a:latin typeface="Cambria Math"/>
                               </a:rPr>
-                              <m:t> 12500</m:t>
+                              <m:t> 12</m:t>
+                            </m:r>
+                            <m:r>
+                              <a:rPr lang="en-US" b="0" i="1" smtClean="0">
+                                <a:latin typeface="Cambria Math"/>
+                              </a:rPr>
+                              <m:t>6</m:t>
+                            </m:r>
+                            <m:r>
+                              <a:rPr lang="en-US" b="0" i="1" smtClean="0">
+                                <a:latin typeface="Cambria Math"/>
+                              </a:rPr>
+                              <m:t>00</m:t>
                             </m:r>
                           </m:e>
                         </m:d>
@@ -12351,7 +12375,19 @@
                           <a:rPr lang="en-US" b="0" i="1" smtClean="0">
                             <a:latin typeface="Cambria Math"/>
                           </a:rPr>
-                          <m:t>=400</m:t>
+                          <m:t>=</m:t>
+                        </m:r>
+                        <m:r>
+                          <a:rPr lang="en-US" b="0" i="1" smtClean="0">
+                            <a:latin typeface="Cambria Math"/>
+                          </a:rPr>
+                          <m:t>5</m:t>
+                        </m:r>
+                        <m:r>
+                          <a:rPr lang="en-US" b="0" i="1" smtClean="0">
+                            <a:latin typeface="Cambria Math"/>
+                          </a:rPr>
+                          <m:t>00</m:t>
                         </m:r>
                         <m:r>
                           <a:rPr lang="en-US" b="0" i="1" baseline="30000" smtClean="0">
@@ -12368,7 +12404,7 @@
             </p:txBody>
           </p:sp>
         </mc:Choice>
-        <mc:Fallback xmlns="">
+        <mc:Fallback>
           <p:sp>
             <p:nvSpPr>
               <p:cNvPr id="17" name="TextBox 16"/>
@@ -12380,7 +12416,7 @@
             <p:spPr>
               <a:xfrm>
                 <a:off x="1515776" y="5856902"/>
-                <a:ext cx="5250861" cy="369332"/>
+                <a:ext cx="5356659" cy="369332"/>
               </a:xfrm>
               <a:prstGeom prst="rect">
                 <a:avLst/>
@@ -12388,7 +12424,7 @@
               <a:blipFill rotWithShape="1">
                 <a:blip r:embed="rId7"/>
                 <a:stretch>
-                  <a:fillRect l="-4181" t="-121667" b="-188333"/>
+                  <a:fillRect l="-4100" t="-121667" b="-188333"/>
                 </a:stretch>
               </a:blipFill>
             </p:spPr>
@@ -12778,7 +12814,7 @@
         <p:spPr>
           <a:xfrm>
             <a:off x="331351" y="6353908"/>
-            <a:ext cx="2443298" cy="369332"/>
+            <a:ext cx="2265364" cy="369332"/>
           </a:xfrm>
           <a:prstGeom prst="rect">
             <a:avLst/>
@@ -12805,7 +12841,47 @@
                   <a:srgbClr val="00B050"/>
                 </a:solidFill>
               </a:rPr>
-              <a:t> = -39000 / 400 = -97.5</a:t>
+              <a:t> = -</a:t>
+            </a:r>
+            <a:r>
+              <a:rPr lang="en-US" b="1" dirty="0" smtClean="0">
+                <a:solidFill>
+                  <a:srgbClr val="00B050"/>
+                </a:solidFill>
+              </a:rPr>
+              <a:t>35000 </a:t>
+            </a:r>
+            <a:r>
+              <a:rPr lang="en-US" b="1" dirty="0" smtClean="0">
+                <a:solidFill>
+                  <a:srgbClr val="00B050"/>
+                </a:solidFill>
+              </a:rPr>
+              <a:t>/ </a:t>
+            </a:r>
+            <a:r>
+              <a:rPr lang="en-US" b="1" dirty="0" smtClean="0">
+                <a:solidFill>
+                  <a:srgbClr val="00B050"/>
+                </a:solidFill>
+              </a:rPr>
+              <a:t>500 </a:t>
+            </a:r>
+            <a:r>
+              <a:rPr lang="en-US" b="1" dirty="0" smtClean="0">
+                <a:solidFill>
+                  <a:srgbClr val="00B050"/>
+                </a:solidFill>
+              </a:rPr>
+              <a:t>= </a:t>
+            </a:r>
+            <a:r>
+              <a:rPr lang="en-US" b="1" dirty="0" smtClean="0">
+                <a:solidFill>
+                  <a:srgbClr val="00B050"/>
+                </a:solidFill>
+              </a:rPr>
+              <a:t>-70</a:t>
             </a:r>
             <a:endParaRPr lang="en-US" b="1" dirty="0">
               <a:solidFill>
@@ -12851,7 +12927,31 @@
                   <a:srgbClr val="00B050"/>
                 </a:solidFill>
               </a:rPr>
-              <a:t> = 2000 / 400 = 5</a:t>
+              <a:t> = 2000 / </a:t>
+            </a:r>
+            <a:r>
+              <a:rPr lang="en-US" b="1" dirty="0" smtClean="0">
+                <a:solidFill>
+                  <a:srgbClr val="00B050"/>
+                </a:solidFill>
+              </a:rPr>
+              <a:t>500 </a:t>
+            </a:r>
+            <a:r>
+              <a:rPr lang="en-US" b="1" dirty="0" smtClean="0">
+                <a:solidFill>
+                  <a:srgbClr val="00B050"/>
+                </a:solidFill>
+              </a:rPr>
+              <a:t>= </a:t>
+            </a:r>
+            <a:r>
+              <a:rPr lang="en-US" b="1" dirty="0" smtClean="0">
+                <a:solidFill>
+                  <a:srgbClr val="00B050"/>
+                </a:solidFill>
+              </a:rPr>
+              <a:t>4</a:t>
             </a:r>
             <a:endParaRPr lang="en-US" b="1" dirty="0">
               <a:solidFill>

</xml_diff>